<commit_message>
Lab 8: minor updates to powerpoint
</commit_message>
<xml_diff>
--- a/Lab 8/CS 341 Lab 8.pptx
+++ b/Lab 8/CS 341 Lab 8.pptx
@@ -356,7 +356,7 @@
           <a:p>
             <a:fld id="{48A87A34-81AB-432B-8DAE-1953F412C126}" type="datetimeFigureOut">
               <a:rPr lang="en-US" smtClean="0"/>
-              <a:t>11/16/2020</a:t>
+              <a:t>11/17/2020</a:t>
             </a:fld>
             <a:endParaRPr lang="en-US" dirty="0"/>
           </a:p>
@@ -564,7 +564,7 @@
           <a:p>
             <a:fld id="{48A87A34-81AB-432B-8DAE-1953F412C126}" type="datetimeFigureOut">
               <a:rPr lang="en-US" smtClean="0"/>
-              <a:t>11/16/2020</a:t>
+              <a:t>11/17/2020</a:t>
             </a:fld>
             <a:endParaRPr lang="en-US" dirty="0"/>
           </a:p>
@@ -820,7 +820,7 @@
           <a:p>
             <a:fld id="{48A87A34-81AB-432B-8DAE-1953F412C126}" type="datetimeFigureOut">
               <a:rPr lang="en-US" smtClean="0"/>
-              <a:t>11/16/2020</a:t>
+              <a:t>11/17/2020</a:t>
             </a:fld>
             <a:endParaRPr lang="en-US" dirty="0"/>
           </a:p>
@@ -994,7 +994,7 @@
           <a:p>
             <a:fld id="{48A87A34-81AB-432B-8DAE-1953F412C126}" type="datetimeFigureOut">
               <a:rPr lang="en-US" smtClean="0"/>
-              <a:t>11/16/2020</a:t>
+              <a:t>11/17/2020</a:t>
             </a:fld>
             <a:endParaRPr lang="en-US" dirty="0"/>
           </a:p>
@@ -1337,7 +1337,7 @@
           <a:p>
             <a:fld id="{48A87A34-81AB-432B-8DAE-1953F412C126}" type="datetimeFigureOut">
               <a:rPr lang="en-US" smtClean="0"/>
-              <a:t>11/16/2020</a:t>
+              <a:t>11/17/2020</a:t>
             </a:fld>
             <a:endParaRPr lang="en-US" dirty="0"/>
           </a:p>
@@ -1612,7 +1612,7 @@
           <a:p>
             <a:fld id="{48A87A34-81AB-432B-8DAE-1953F412C126}" type="datetimeFigureOut">
               <a:rPr lang="en-US" smtClean="0"/>
-              <a:t>11/16/2020</a:t>
+              <a:t>11/17/2020</a:t>
             </a:fld>
             <a:endParaRPr lang="en-US" dirty="0"/>
           </a:p>
@@ -1991,7 +1991,7 @@
           <a:p>
             <a:fld id="{48A87A34-81AB-432B-8DAE-1953F412C126}" type="datetimeFigureOut">
               <a:rPr lang="en-US" smtClean="0"/>
-              <a:t>11/16/2020</a:t>
+              <a:t>11/17/2020</a:t>
             </a:fld>
             <a:endParaRPr lang="en-US" dirty="0"/>
           </a:p>
@@ -2109,7 +2109,7 @@
           <a:p>
             <a:fld id="{48A87A34-81AB-432B-8DAE-1953F412C126}" type="datetimeFigureOut">
               <a:rPr lang="en-US" smtClean="0"/>
-              <a:t>11/16/2020</a:t>
+              <a:t>11/17/2020</a:t>
             </a:fld>
             <a:endParaRPr lang="en-US" dirty="0"/>
           </a:p>
@@ -2280,7 +2280,7 @@
           <a:p>
             <a:fld id="{48A87A34-81AB-432B-8DAE-1953F412C126}" type="datetimeFigureOut">
               <a:rPr lang="en-US" smtClean="0"/>
-              <a:t>11/16/2020</a:t>
+              <a:t>11/17/2020</a:t>
             </a:fld>
             <a:endParaRPr lang="en-US" dirty="0"/>
           </a:p>
@@ -2634,7 +2634,7 @@
           <a:p>
             <a:fld id="{48A87A34-81AB-432B-8DAE-1953F412C126}" type="datetimeFigureOut">
               <a:rPr lang="en-US" smtClean="0"/>
-              <a:t>11/16/2020</a:t>
+              <a:t>11/17/2020</a:t>
             </a:fld>
             <a:endParaRPr lang="en-US" dirty="0"/>
           </a:p>
@@ -3016,7 +3016,7 @@
           <a:p>
             <a:fld id="{48A87A34-81AB-432B-8DAE-1953F412C126}" type="datetimeFigureOut">
               <a:rPr lang="en-US" smtClean="0"/>
-              <a:t>11/16/2020</a:t>
+              <a:t>11/17/2020</a:t>
             </a:fld>
             <a:endParaRPr lang="en-US" dirty="0"/>
           </a:p>
@@ -3304,7 +3304,7 @@
             <a:fld id="{48A87A34-81AB-432B-8DAE-1953F412C126}" type="datetimeFigureOut">
               <a:rPr lang="en-US" smtClean="0"/>
               <a:pPr/>
-              <a:t>11/16/2020</a:t>
+              <a:t>11/17/2020</a:t>
             </a:fld>
             <a:endParaRPr lang="en-US" dirty="0"/>
           </a:p>
@@ -3853,7 +3853,7 @@
             <a:pPr algn="ctr"/>
             <a:r>
               <a:rPr lang="en-US" dirty="0"/>
-              <a:t>CS 341 Lab 7</a:t>
+              <a:t>CS 341 Lab 8</a:t>
             </a:r>
           </a:p>
         </p:txBody>
@@ -5315,6 +5315,33 @@
               </a:rPr>
               <a:t>(frequency, 5);</a:t>
             </a:r>
+          </a:p>
+          <a:p>
+            <a:pPr lvl="1">
+              <a:buFont typeface="Wingdings" panose="05000000000000000000" pitchFamily="2" charset="2"/>
+              <a:buChar char="§"/>
+            </a:pPr>
+            <a:r>
+              <a:rPr lang="en-US" sz="1600" dirty="0">
+                <a:effectLst/>
+                <a:latin typeface="Calibri" panose="020F0502020204030204" pitchFamily="34" charset="0"/>
+                <a:ea typeface="Calibri" panose="020F0502020204030204" pitchFamily="34" charset="0"/>
+              </a:rPr>
+              <a:t>Be careful of division between </a:t>
+            </a:r>
+            <a:r>
+              <a:rPr lang="en-US" sz="1600">
+                <a:effectLst/>
+                <a:latin typeface="Calibri" panose="020F0502020204030204" pitchFamily="34" charset="0"/>
+                <a:ea typeface="Calibri" panose="020F0502020204030204" pitchFamily="34" charset="0"/>
+              </a:rPr>
+              <a:t>two integers</a:t>
+            </a:r>
+            <a:endParaRPr lang="en-US" sz="1600" dirty="0">
+              <a:effectLst/>
+              <a:latin typeface="Calibri" panose="020F0502020204030204" pitchFamily="34" charset="0"/>
+              <a:ea typeface="Calibri" panose="020F0502020204030204" pitchFamily="34" charset="0"/>
+            </a:endParaRPr>
           </a:p>
         </p:txBody>
       </p:sp>

</xml_diff>